<commit_message>
added slack custom app creation video
</commit_message>
<xml_diff>
--- a/Presentations/.Net LINQ.pptx
+++ b/Presentations/.Net LINQ.pptx
@@ -5,20 +5,19 @@
     <p:sldMasterId id="2147483648" r:id="rId4"/>
   </p:sldMasterIdLst>
   <p:notesMasterIdLst>
-    <p:notesMasterId r:id="rId16"/>
+    <p:notesMasterId r:id="rId15"/>
   </p:notesMasterIdLst>
   <p:sldIdLst>
     <p:sldId id="539" r:id="rId5"/>
-    <p:sldId id="570" r:id="rId6"/>
-    <p:sldId id="257" r:id="rId7"/>
-    <p:sldId id="547" r:id="rId8"/>
-    <p:sldId id="564" r:id="rId9"/>
-    <p:sldId id="563" r:id="rId10"/>
-    <p:sldId id="566" r:id="rId11"/>
-    <p:sldId id="565" r:id="rId12"/>
-    <p:sldId id="568" r:id="rId13"/>
-    <p:sldId id="569" r:id="rId14"/>
-    <p:sldId id="562" r:id="rId15"/>
+    <p:sldId id="257" r:id="rId6"/>
+    <p:sldId id="547" r:id="rId7"/>
+    <p:sldId id="564" r:id="rId8"/>
+    <p:sldId id="563" r:id="rId9"/>
+    <p:sldId id="566" r:id="rId10"/>
+    <p:sldId id="565" r:id="rId11"/>
+    <p:sldId id="568" r:id="rId12"/>
+    <p:sldId id="569" r:id="rId13"/>
+    <p:sldId id="562" r:id="rId14"/>
   </p:sldIdLst>
   <p:sldSz cx="12192000" cy="6858000"/>
   <p:notesSz cx="6858000" cy="9144000"/>
@@ -207,7 +206,7 @@
           <a:p>
             <a:fld id="{A90BC4F2-6A87-450D-AD53-D2188421BC53}" type="datetimeFigureOut">
               <a:rPr lang="en-US" smtClean="0"/>
-              <a:t>3/4/2024</a:t>
+              <a:t>3/9/2024</a:t>
             </a:fld>
             <a:endParaRPr lang="en-US"/>
           </a:p>
@@ -566,131 +565,6 @@
     <p:extLst>
       <p:ext uri="{BB962C8B-B14F-4D97-AF65-F5344CB8AC3E}">
         <p14:creationId xmlns:p14="http://schemas.microsoft.com/office/powerpoint/2010/main" val="372418776"/>
-      </p:ext>
-    </p:extLst>
-  </p:cSld>
-  <p:clrMapOvr>
-    <a:masterClrMapping/>
-  </p:clrMapOvr>
-</p:notes>
-</file>
-
-<file path=ppt/notesSlides/notesSlide2.xml><?xml version="1.0" encoding="utf-8"?>
-<p:notes xmlns:a="http://schemas.openxmlformats.org/drawingml/2006/main" xmlns:r="http://schemas.openxmlformats.org/officeDocument/2006/relationships" xmlns:p="http://schemas.openxmlformats.org/presentationml/2006/main">
-  <p:cSld>
-    <p:spTree>
-      <p:nvGrpSpPr>
-        <p:cNvPr id="1" name="">
-          <a:extLst>
-            <a:ext uri="{FF2B5EF4-FFF2-40B4-BE49-F238E27FC236}">
-              <a16:creationId xmlns:a16="http://schemas.microsoft.com/office/drawing/2014/main" id="{4C88A71C-7E43-8CAB-AA27-C45AF5EAAE57}"/>
-            </a:ext>
-          </a:extLst>
-        </p:cNvPr>
-        <p:cNvGrpSpPr/>
-        <p:nvPr/>
-      </p:nvGrpSpPr>
-      <p:grpSpPr>
-        <a:xfrm>
-          <a:off x="0" y="0"/>
-          <a:ext cx="0" cy="0"/>
-          <a:chOff x="0" y="0"/>
-          <a:chExt cx="0" cy="0"/>
-        </a:xfrm>
-      </p:grpSpPr>
-      <p:sp>
-        <p:nvSpPr>
-          <p:cNvPr id="2" name="Slide Image Placeholder 1">
-            <a:extLst>
-              <a:ext uri="{FF2B5EF4-FFF2-40B4-BE49-F238E27FC236}">
-                <a16:creationId xmlns:a16="http://schemas.microsoft.com/office/drawing/2014/main" id="{2C781917-339F-3ECD-0735-4DE46DD1F572}"/>
-              </a:ext>
-            </a:extLst>
-          </p:cNvPr>
-          <p:cNvSpPr>
-            <a:spLocks noGrp="1" noRot="1" noChangeAspect="1"/>
-          </p:cNvSpPr>
-          <p:nvPr>
-            <p:ph type="sldImg"/>
-          </p:nvPr>
-        </p:nvSpPr>
-        <p:spPr/>
-      </p:sp>
-      <p:sp>
-        <p:nvSpPr>
-          <p:cNvPr id="3" name="Notes Placeholder 2">
-            <a:extLst>
-              <a:ext uri="{FF2B5EF4-FFF2-40B4-BE49-F238E27FC236}">
-                <a16:creationId xmlns:a16="http://schemas.microsoft.com/office/drawing/2014/main" id="{F6AA74EE-103D-89D8-8B40-89AC6FE40A48}"/>
-              </a:ext>
-            </a:extLst>
-          </p:cNvPr>
-          <p:cNvSpPr>
-            <a:spLocks noGrp="1"/>
-          </p:cNvSpPr>
-          <p:nvPr>
-            <p:ph type="body" idx="1"/>
-          </p:nvPr>
-        </p:nvSpPr>
-        <p:spPr/>
-        <p:txBody>
-          <a:bodyPr/>
-          <a:lstStyle/>
-          <a:p>
-            <a:pPr marL="0" marR="0" lvl="0" indent="0" algn="l" defTabSz="914400" rtl="0" eaLnBrk="1" fontAlgn="auto" latinLnBrk="0" hangingPunct="1">
-              <a:lnSpc>
-                <a:spcPct val="100000"/>
-              </a:lnSpc>
-              <a:spcBef>
-                <a:spcPts val="0"/>
-              </a:spcBef>
-              <a:spcAft>
-                <a:spcPts val="0"/>
-              </a:spcAft>
-              <a:buClrTx/>
-              <a:buSzTx/>
-              <a:buFontTx/>
-              <a:buNone/>
-              <a:tabLst/>
-              <a:defRPr/>
-            </a:pPr>
-            <a:endParaRPr lang="en-US" dirty="0"/>
-          </a:p>
-        </p:txBody>
-      </p:sp>
-      <p:sp>
-        <p:nvSpPr>
-          <p:cNvPr id="4" name="Slide Number Placeholder 3">
-            <a:extLst>
-              <a:ext uri="{FF2B5EF4-FFF2-40B4-BE49-F238E27FC236}">
-                <a16:creationId xmlns:a16="http://schemas.microsoft.com/office/drawing/2014/main" id="{9D02371B-9562-4CE1-2B5A-CF61D212A042}"/>
-              </a:ext>
-            </a:extLst>
-          </p:cNvPr>
-          <p:cNvSpPr>
-            <a:spLocks noGrp="1"/>
-          </p:cNvSpPr>
-          <p:nvPr>
-            <p:ph type="sldNum" sz="quarter" idx="5"/>
-          </p:nvPr>
-        </p:nvSpPr>
-        <p:spPr/>
-        <p:txBody>
-          <a:bodyPr/>
-          <a:lstStyle/>
-          <a:p>
-            <a:fld id="{303401A8-3220-413E-B964-4A8659985FD3}" type="slidenum">
-              <a:rPr lang="en-US" smtClean="0"/>
-              <a:t>2</a:t>
-            </a:fld>
-            <a:endParaRPr lang="en-US"/>
-          </a:p>
-        </p:txBody>
-      </p:sp>
-    </p:spTree>
-    <p:extLst>
-      <p:ext uri="{BB962C8B-B14F-4D97-AF65-F5344CB8AC3E}">
-        <p14:creationId xmlns:p14="http://schemas.microsoft.com/office/powerpoint/2010/main" val="3742924761"/>
       </p:ext>
     </p:extLst>
   </p:cSld>
@@ -6798,227 +6672,6 @@
   <p:cSld>
     <p:spTree>
       <p:nvGrpSpPr>
-        <p:cNvPr id="1" name="">
-          <a:extLst>
-            <a:ext uri="{FF2B5EF4-FFF2-40B4-BE49-F238E27FC236}">
-              <a16:creationId xmlns:a16="http://schemas.microsoft.com/office/drawing/2014/main" id="{AFFC4AAC-8960-83D9-E898-63F5849368DC}"/>
-            </a:ext>
-          </a:extLst>
-        </p:cNvPr>
-        <p:cNvGrpSpPr/>
-        <p:nvPr/>
-      </p:nvGrpSpPr>
-      <p:grpSpPr>
-        <a:xfrm>
-          <a:off x="0" y="0"/>
-          <a:ext cx="0" cy="0"/>
-          <a:chOff x="0" y="0"/>
-          <a:chExt cx="0" cy="0"/>
-        </a:xfrm>
-      </p:grpSpPr>
-      <p:sp>
-        <p:nvSpPr>
-          <p:cNvPr id="2" name="Title 1">
-            <a:extLst>
-              <a:ext uri="{FF2B5EF4-FFF2-40B4-BE49-F238E27FC236}">
-                <a16:creationId xmlns:a16="http://schemas.microsoft.com/office/drawing/2014/main" id="{6995E0EE-9B45-C790-ED8F-C1AD728C98D0}"/>
-              </a:ext>
-            </a:extLst>
-          </p:cNvPr>
-          <p:cNvSpPr>
-            <a:spLocks noGrp="1"/>
-          </p:cNvSpPr>
-          <p:nvPr>
-            <p:ph type="title"/>
-          </p:nvPr>
-        </p:nvSpPr>
-        <p:spPr/>
-        <p:txBody>
-          <a:bodyPr/>
-          <a:lstStyle/>
-          <a:p>
-            <a:r>
-              <a:rPr lang="en-US" dirty="0"/>
-              <a:t>Use Case3</a:t>
-            </a:r>
-          </a:p>
-        </p:txBody>
-      </p:sp>
-      <p:sp>
-        <p:nvSpPr>
-          <p:cNvPr id="3" name="Content Placeholder 2">
-            <a:extLst>
-              <a:ext uri="{FF2B5EF4-FFF2-40B4-BE49-F238E27FC236}">
-                <a16:creationId xmlns:a16="http://schemas.microsoft.com/office/drawing/2014/main" id="{2609771F-212F-14EB-AD6A-C4B60430E12F}"/>
-              </a:ext>
-            </a:extLst>
-          </p:cNvPr>
-          <p:cNvSpPr>
-            <a:spLocks noGrp="1"/>
-          </p:cNvSpPr>
-          <p:nvPr>
-            <p:ph idx="1"/>
-          </p:nvPr>
-        </p:nvSpPr>
-        <p:spPr>
-          <a:xfrm>
-            <a:off x="1286414" y="2492076"/>
-            <a:ext cx="4468033" cy="3127248"/>
-          </a:xfrm>
-        </p:spPr>
-        <p:txBody>
-          <a:bodyPr>
-            <a:normAutofit/>
-          </a:bodyPr>
-          <a:lstStyle/>
-          <a:p>
-            <a:pPr marL="0" indent="0">
-              <a:buNone/>
-            </a:pPr>
-            <a:r>
-              <a:rPr lang="en-US" sz="2400" dirty="0"/>
-              <a:t>In data table, which contains departments and their corresponding salaries, your task is to calculate the total salary for each department. </a:t>
-            </a:r>
-          </a:p>
-        </p:txBody>
-      </p:sp>
-      <p:sp>
-        <p:nvSpPr>
-          <p:cNvPr id="6" name="Slide Number Placeholder 5">
-            <a:extLst>
-              <a:ext uri="{FF2B5EF4-FFF2-40B4-BE49-F238E27FC236}">
-                <a16:creationId xmlns:a16="http://schemas.microsoft.com/office/drawing/2014/main" id="{0E04C06E-EBDD-A39E-58CC-3437CDF693A7}"/>
-              </a:ext>
-            </a:extLst>
-          </p:cNvPr>
-          <p:cNvSpPr>
-            <a:spLocks noGrp="1"/>
-          </p:cNvSpPr>
-          <p:nvPr>
-            <p:ph type="sldNum" sz="quarter" idx="12"/>
-          </p:nvPr>
-        </p:nvSpPr>
-        <p:spPr/>
-        <p:txBody>
-          <a:bodyPr/>
-          <a:lstStyle/>
-          <a:p>
-            <a:fld id="{CB1E4CB7-CB13-4810-BF18-BE31AFC64F93}" type="slidenum">
-              <a:rPr lang="en-US" smtClean="0"/>
-              <a:t>10</a:t>
-            </a:fld>
-            <a:endParaRPr lang="en-US"/>
-          </a:p>
-        </p:txBody>
-      </p:sp>
-      <p:pic>
-        <p:nvPicPr>
-          <p:cNvPr id="8" name="Picture 7">
-            <a:extLst>
-              <a:ext uri="{FF2B5EF4-FFF2-40B4-BE49-F238E27FC236}">
-                <a16:creationId xmlns:a16="http://schemas.microsoft.com/office/drawing/2014/main" id="{8A9DFA94-6CCF-367C-AFA3-ECE0F64C3C70}"/>
-              </a:ext>
-            </a:extLst>
-          </p:cNvPr>
-          <p:cNvPicPr>
-            <a:picLocks noChangeAspect="1"/>
-          </p:cNvPicPr>
-          <p:nvPr/>
-        </p:nvPicPr>
-        <p:blipFill>
-          <a:blip r:embed="rId2"/>
-          <a:stretch>
-            <a:fillRect/>
-          </a:stretch>
-        </p:blipFill>
-        <p:spPr>
-          <a:xfrm>
-            <a:off x="5754447" y="1775756"/>
-            <a:ext cx="2858565" cy="3190527"/>
-          </a:xfrm>
-          <a:prstGeom prst="rect">
-            <a:avLst/>
-          </a:prstGeom>
-        </p:spPr>
-      </p:pic>
-      <p:pic>
-        <p:nvPicPr>
-          <p:cNvPr id="10" name="Picture 9">
-            <a:extLst>
-              <a:ext uri="{FF2B5EF4-FFF2-40B4-BE49-F238E27FC236}">
-                <a16:creationId xmlns:a16="http://schemas.microsoft.com/office/drawing/2014/main" id="{80E77136-486C-304F-A331-466D90D93BEB}"/>
-              </a:ext>
-            </a:extLst>
-          </p:cNvPr>
-          <p:cNvPicPr>
-            <a:picLocks noChangeAspect="1"/>
-          </p:cNvPicPr>
-          <p:nvPr/>
-        </p:nvPicPr>
-        <p:blipFill>
-          <a:blip r:embed="rId3"/>
-          <a:stretch>
-            <a:fillRect/>
-          </a:stretch>
-        </p:blipFill>
-        <p:spPr>
-          <a:xfrm>
-            <a:off x="8805672" y="2798090"/>
-            <a:ext cx="2397976" cy="1442607"/>
-          </a:xfrm>
-          <a:prstGeom prst="rect">
-            <a:avLst/>
-          </a:prstGeom>
-        </p:spPr>
-      </p:pic>
-      <p:pic>
-        <p:nvPicPr>
-          <p:cNvPr id="15" name="Picture 14">
-            <a:extLst>
-              <a:ext uri="{FF2B5EF4-FFF2-40B4-BE49-F238E27FC236}">
-                <a16:creationId xmlns:a16="http://schemas.microsoft.com/office/drawing/2014/main" id="{4E5F3BA7-30EC-3745-54FA-76F45A8DBDCD}"/>
-              </a:ext>
-            </a:extLst>
-          </p:cNvPr>
-          <p:cNvPicPr>
-            <a:picLocks noChangeAspect="1"/>
-          </p:cNvPicPr>
-          <p:nvPr/>
-        </p:nvPicPr>
-        <p:blipFill>
-          <a:blip r:embed="rId4"/>
-          <a:stretch>
-            <a:fillRect/>
-          </a:stretch>
-        </p:blipFill>
-        <p:spPr>
-          <a:xfrm>
-            <a:off x="9523315" y="2189988"/>
-            <a:ext cx="962690" cy="457279"/>
-          </a:xfrm>
-          <a:prstGeom prst="rect">
-            <a:avLst/>
-          </a:prstGeom>
-        </p:spPr>
-      </p:pic>
-    </p:spTree>
-    <p:extLst>
-      <p:ext uri="{BB962C8B-B14F-4D97-AF65-F5344CB8AC3E}">
-        <p14:creationId xmlns:p14="http://schemas.microsoft.com/office/powerpoint/2010/main" val="4202168026"/>
-      </p:ext>
-    </p:extLst>
-  </p:cSld>
-  <p:clrMapOvr>
-    <a:masterClrMapping/>
-  </p:clrMapOvr>
-</p:sld>
-</file>
-
-<file path=ppt/slides/slide11.xml><?xml version="1.0" encoding="utf-8"?>
-<p:sld xmlns:a="http://schemas.openxmlformats.org/drawingml/2006/main" xmlns:r="http://schemas.openxmlformats.org/officeDocument/2006/relationships" xmlns:p="http://schemas.openxmlformats.org/presentationml/2006/main">
-  <p:cSld>
-    <p:spTree>
-      <p:nvGrpSpPr>
         <p:cNvPr id="1" name=""/>
         <p:cNvGrpSpPr/>
         <p:nvPr/>
@@ -7059,7 +6712,7 @@
                 </a:solidFill>
               </a:rPr>
               <a:pPr/>
-              <a:t>11</a:t>
+              <a:t>10</a:t>
             </a:fld>
             <a:endParaRPr lang="en-US" dirty="0">
               <a:solidFill>
@@ -7209,73 +6862,6 @@
   <p:cSld>
     <p:spTree>
       <p:nvGrpSpPr>
-        <p:cNvPr id="1" name="">
-          <a:extLst>
-            <a:ext uri="{FF2B5EF4-FFF2-40B4-BE49-F238E27FC236}">
-              <a16:creationId xmlns:a16="http://schemas.microsoft.com/office/drawing/2014/main" id="{99B6425E-72C5-505A-E933-816FE67E399F}"/>
-            </a:ext>
-          </a:extLst>
-        </p:cNvPr>
-        <p:cNvGrpSpPr/>
-        <p:nvPr/>
-      </p:nvGrpSpPr>
-      <p:grpSpPr>
-        <a:xfrm>
-          <a:off x="0" y="0"/>
-          <a:ext cx="0" cy="0"/>
-          <a:chOff x="0" y="0"/>
-          <a:chExt cx="0" cy="0"/>
-        </a:xfrm>
-      </p:grpSpPr>
-      <p:pic>
-        <p:nvPicPr>
-          <p:cNvPr id="9" name="Picture Placeholder 8">
-            <a:extLst>
-              <a:ext uri="{FF2B5EF4-FFF2-40B4-BE49-F238E27FC236}">
-                <a16:creationId xmlns:a16="http://schemas.microsoft.com/office/drawing/2014/main" id="{180D8E2C-8B81-E338-7A92-ECAA45CF41CB}"/>
-              </a:ext>
-            </a:extLst>
-          </p:cNvPr>
-          <p:cNvPicPr>
-            <a:picLocks noGrp="1" noChangeAspect="1"/>
-          </p:cNvPicPr>
-          <p:nvPr>
-            <p:ph type="pic" sz="quarter" idx="13"/>
-          </p:nvPr>
-        </p:nvPicPr>
-        <p:blipFill rotWithShape="1">
-          <a:blip r:embed="rId3"/>
-          <a:srcRect l="4272" r="4272" b="8740"/>
-          <a:stretch/>
-        </p:blipFill>
-        <p:spPr>
-          <a:xfrm>
-            <a:off x="5330952" y="813434"/>
-            <a:ext cx="6099048" cy="4602481"/>
-          </a:xfrm>
-        </p:spPr>
-      </p:pic>
-    </p:spTree>
-    <p:extLst>
-      <p:ext uri="{BB962C8B-B14F-4D97-AF65-F5344CB8AC3E}">
-        <p14:creationId xmlns:p14="http://schemas.microsoft.com/office/powerpoint/2010/main" val="2424599014"/>
-      </p:ext>
-    </p:extLst>
-  </p:cSld>
-  <p:clrMapOvr>
-    <a:masterClrMapping/>
-  </p:clrMapOvr>
-  <p:transition spd="slow">
-    <p:push dir="u"/>
-  </p:transition>
-</p:sld>
-</file>
-
-<file path=ppt/slides/slide3.xml><?xml version="1.0" encoding="utf-8"?>
-<p:sld xmlns:a="http://schemas.openxmlformats.org/drawingml/2006/main" xmlns:r="http://schemas.openxmlformats.org/officeDocument/2006/relationships" xmlns:p="http://schemas.openxmlformats.org/presentationml/2006/main">
-  <p:cSld>
-    <p:spTree>
-      <p:nvGrpSpPr>
         <p:cNvPr id="1" name=""/>
         <p:cNvGrpSpPr/>
         <p:nvPr/>
@@ -7460,7 +7046,7 @@
             <a:fld id="{CB1E4CB7-CB13-4810-BF18-BE31AFC64F93}" type="slidenum">
               <a:rPr lang="en-US" smtClean="0"/>
               <a:pPr/>
-              <a:t>3</a:t>
+              <a:t>2</a:t>
             </a:fld>
             <a:endParaRPr lang="en-US"/>
           </a:p>
@@ -7873,7 +7459,7 @@
 </p:sld>
 </file>
 
-<file path=ppt/slides/slide4.xml><?xml version="1.0" encoding="utf-8"?>
+<file path=ppt/slides/slide3.xml><?xml version="1.0" encoding="utf-8"?>
 <p:sld xmlns:a="http://schemas.openxmlformats.org/drawingml/2006/main" xmlns:r="http://schemas.openxmlformats.org/officeDocument/2006/relationships" xmlns:p="http://schemas.openxmlformats.org/presentationml/2006/main">
   <p:cSld>
     <p:spTree>
@@ -8029,7 +7615,7 @@
             <a:fld id="{CB1E4CB7-CB13-4810-BF18-BE31AFC64F93}" type="slidenum">
               <a:rPr lang="en-US" smtClean="0"/>
               <a:pPr/>
-              <a:t>4</a:t>
+              <a:t>3</a:t>
             </a:fld>
             <a:endParaRPr lang="en-US"/>
           </a:p>
@@ -8272,6 +7858,259 @@
 </p:sld>
 </file>
 
+<file path=ppt/slides/slide4.xml><?xml version="1.0" encoding="utf-8"?>
+<p:sld xmlns:a="http://schemas.openxmlformats.org/drawingml/2006/main" xmlns:r="http://schemas.openxmlformats.org/officeDocument/2006/relationships" xmlns:p="http://schemas.openxmlformats.org/presentationml/2006/main">
+  <p:cSld>
+    <p:spTree>
+      <p:nvGrpSpPr>
+        <p:cNvPr id="1" name=""/>
+        <p:cNvGrpSpPr/>
+        <p:nvPr/>
+      </p:nvGrpSpPr>
+      <p:grpSpPr>
+        <a:xfrm>
+          <a:off x="0" y="0"/>
+          <a:ext cx="0" cy="0"/>
+          <a:chOff x="0" y="0"/>
+          <a:chExt cx="0" cy="0"/>
+        </a:xfrm>
+      </p:grpSpPr>
+      <p:sp>
+        <p:nvSpPr>
+          <p:cNvPr id="2" name="Title 1">
+            <a:extLst>
+              <a:ext uri="{FF2B5EF4-FFF2-40B4-BE49-F238E27FC236}">
+                <a16:creationId xmlns:a16="http://schemas.microsoft.com/office/drawing/2014/main" id="{BF46AD76-529C-9CE5-3D60-3D7C7E78E8D2}"/>
+              </a:ext>
+            </a:extLst>
+          </p:cNvPr>
+          <p:cNvSpPr>
+            <a:spLocks noGrp="1"/>
+          </p:cNvSpPr>
+          <p:nvPr>
+            <p:ph type="title"/>
+          </p:nvPr>
+        </p:nvSpPr>
+        <p:spPr/>
+        <p:txBody>
+          <a:bodyPr/>
+          <a:lstStyle/>
+          <a:p>
+            <a:r>
+              <a:rPr lang="en-US" dirty="0"/>
+              <a:t>Syntax Styles</a:t>
+            </a:r>
+          </a:p>
+        </p:txBody>
+      </p:sp>
+      <p:pic>
+        <p:nvPicPr>
+          <p:cNvPr id="23" name="Picture Placeholder 22">
+            <a:extLst>
+              <a:ext uri="{FF2B5EF4-FFF2-40B4-BE49-F238E27FC236}">
+                <a16:creationId xmlns:a16="http://schemas.microsoft.com/office/drawing/2014/main" id="{FCDC0301-BEF2-74FE-F2CF-64AC5AEAB05C}"/>
+              </a:ext>
+            </a:extLst>
+          </p:cNvPr>
+          <p:cNvPicPr>
+            <a:picLocks noGrp="1" noChangeAspect="1"/>
+          </p:cNvPicPr>
+          <p:nvPr>
+            <p:ph type="pic" sz="quarter" idx="13"/>
+          </p:nvPr>
+        </p:nvPicPr>
+        <p:blipFill rotWithShape="1">
+          <a:blip r:embed="rId2"/>
+          <a:srcRect l="4895" r="1456"/>
+          <a:stretch/>
+        </p:blipFill>
+        <p:spPr>
+          <a:xfrm>
+            <a:off x="865632" y="2798051"/>
+            <a:ext cx="3703320" cy="2911734"/>
+          </a:xfrm>
+          <a:prstGeom prst="rect">
+            <a:avLst/>
+          </a:prstGeom>
+          <a:ln>
+            <a:noFill/>
+          </a:ln>
+          <a:effectLst>
+            <a:outerShdw blurRad="292100" dist="139700" dir="2700000" algn="tl" rotWithShape="0">
+              <a:srgbClr val="333333">
+                <a:alpha val="65000"/>
+              </a:srgbClr>
+            </a:outerShdw>
+          </a:effectLst>
+        </p:spPr>
+      </p:pic>
+      <p:sp>
+        <p:nvSpPr>
+          <p:cNvPr id="6" name="Content Placeholder 5">
+            <a:extLst>
+              <a:ext uri="{FF2B5EF4-FFF2-40B4-BE49-F238E27FC236}">
+                <a16:creationId xmlns:a16="http://schemas.microsoft.com/office/drawing/2014/main" id="{C42D24F6-F720-AEB9-1C97-B5AD830B5648}"/>
+              </a:ext>
+            </a:extLst>
+          </p:cNvPr>
+          <p:cNvSpPr>
+            <a:spLocks noGrp="1"/>
+          </p:cNvSpPr>
+          <p:nvPr>
+            <p:ph idx="1"/>
+          </p:nvPr>
+        </p:nvSpPr>
+        <p:spPr/>
+        <p:txBody>
+          <a:bodyPr>
+            <a:normAutofit/>
+          </a:bodyPr>
+          <a:lstStyle/>
+          <a:p>
+            <a:pPr marL="514350" indent="-514350">
+              <a:buFont typeface="+mj-lt"/>
+              <a:buAutoNum type="arabicPeriod"/>
+            </a:pPr>
+            <a:r>
+              <a:rPr lang="en-US" dirty="0"/>
+              <a:t>Method Syntax</a:t>
+            </a:r>
+          </a:p>
+          <a:p>
+            <a:pPr marL="514350" indent="-514350">
+              <a:buFont typeface="+mj-lt"/>
+              <a:buAutoNum type="arabicPeriod"/>
+            </a:pPr>
+            <a:endParaRPr lang="en-US" dirty="0"/>
+          </a:p>
+          <a:p>
+            <a:pPr marL="514350" indent="-514350">
+              <a:buFont typeface="+mj-lt"/>
+              <a:buAutoNum type="arabicPeriod"/>
+            </a:pPr>
+            <a:endParaRPr lang="en-US" dirty="0"/>
+          </a:p>
+          <a:p>
+            <a:pPr marL="514350" indent="-514350">
+              <a:buFont typeface="+mj-lt"/>
+              <a:buAutoNum type="arabicPeriod"/>
+            </a:pPr>
+            <a:r>
+              <a:rPr lang="en-US" dirty="0"/>
+              <a:t>Query Syntax</a:t>
+            </a:r>
+          </a:p>
+          <a:p>
+            <a:pPr marL="514350" indent="-514350">
+              <a:buFont typeface="+mj-lt"/>
+              <a:buAutoNum type="arabicPeriod"/>
+            </a:pPr>
+            <a:endParaRPr lang="en-US" dirty="0"/>
+          </a:p>
+        </p:txBody>
+      </p:sp>
+      <p:sp>
+        <p:nvSpPr>
+          <p:cNvPr id="9" name="Slide Number Placeholder 8">
+            <a:extLst>
+              <a:ext uri="{FF2B5EF4-FFF2-40B4-BE49-F238E27FC236}">
+                <a16:creationId xmlns:a16="http://schemas.microsoft.com/office/drawing/2014/main" id="{F1FCD897-3044-B6DC-A87C-40EA89DE6FDF}"/>
+              </a:ext>
+            </a:extLst>
+          </p:cNvPr>
+          <p:cNvSpPr>
+            <a:spLocks noGrp="1"/>
+          </p:cNvSpPr>
+          <p:nvPr>
+            <p:ph type="sldNum" sz="quarter" idx="12"/>
+          </p:nvPr>
+        </p:nvSpPr>
+        <p:spPr/>
+        <p:txBody>
+          <a:bodyPr/>
+          <a:lstStyle/>
+          <a:p>
+            <a:fld id="{CB1E4CB7-CB13-4810-BF18-BE31AFC64F93}" type="slidenum">
+              <a:rPr lang="en-US" smtClean="0"/>
+              <a:t>4</a:t>
+            </a:fld>
+            <a:endParaRPr lang="en-US"/>
+          </a:p>
+        </p:txBody>
+      </p:sp>
+      <p:pic>
+        <p:nvPicPr>
+          <p:cNvPr id="17" name="Picture 16">
+            <a:extLst>
+              <a:ext uri="{FF2B5EF4-FFF2-40B4-BE49-F238E27FC236}">
+                <a16:creationId xmlns:a16="http://schemas.microsoft.com/office/drawing/2014/main" id="{DF6980DE-5175-BAB6-3297-302309A7076C}"/>
+              </a:ext>
+            </a:extLst>
+          </p:cNvPr>
+          <p:cNvPicPr>
+            <a:picLocks noChangeAspect="1"/>
+          </p:cNvPicPr>
+          <p:nvPr/>
+        </p:nvPicPr>
+        <p:blipFill>
+          <a:blip r:embed="rId3"/>
+          <a:stretch>
+            <a:fillRect/>
+          </a:stretch>
+        </p:blipFill>
+        <p:spPr>
+          <a:xfrm>
+            <a:off x="6096000" y="3644318"/>
+            <a:ext cx="4991100" cy="609600"/>
+          </a:xfrm>
+          <a:prstGeom prst="rect">
+            <a:avLst/>
+          </a:prstGeom>
+        </p:spPr>
+      </p:pic>
+      <p:pic>
+        <p:nvPicPr>
+          <p:cNvPr id="19" name="Picture 18">
+            <a:extLst>
+              <a:ext uri="{FF2B5EF4-FFF2-40B4-BE49-F238E27FC236}">
+                <a16:creationId xmlns:a16="http://schemas.microsoft.com/office/drawing/2014/main" id="{8E42E156-6C8C-DA0B-200C-26B997CB1FA4}"/>
+              </a:ext>
+            </a:extLst>
+          </p:cNvPr>
+          <p:cNvPicPr>
+            <a:picLocks noChangeAspect="1"/>
+          </p:cNvPicPr>
+          <p:nvPr/>
+        </p:nvPicPr>
+        <p:blipFill>
+          <a:blip r:embed="rId4"/>
+          <a:stretch>
+            <a:fillRect/>
+          </a:stretch>
+        </p:blipFill>
+        <p:spPr>
+          <a:xfrm>
+            <a:off x="6096000" y="5124379"/>
+            <a:ext cx="4991100" cy="613754"/>
+          </a:xfrm>
+          <a:prstGeom prst="rect">
+            <a:avLst/>
+          </a:prstGeom>
+        </p:spPr>
+      </p:pic>
+    </p:spTree>
+    <p:extLst>
+      <p:ext uri="{BB962C8B-B14F-4D97-AF65-F5344CB8AC3E}">
+        <p14:creationId xmlns:p14="http://schemas.microsoft.com/office/powerpoint/2010/main" val="2878823389"/>
+      </p:ext>
+    </p:extLst>
+  </p:cSld>
+  <p:clrMapOvr>
+    <a:masterClrMapping/>
+  </p:clrMapOvr>
+</p:sld>
+</file>
+
 <file path=ppt/slides/slide5.xml><?xml version="1.0" encoding="utf-8"?>
 <p:sld xmlns:a="http://schemas.openxmlformats.org/drawingml/2006/main" xmlns:r="http://schemas.openxmlformats.org/officeDocument/2006/relationships" xmlns:p="http://schemas.openxmlformats.org/presentationml/2006/main">
   <p:cSld>
@@ -8294,7 +8133,7 @@
           <p:cNvPr id="2" name="Title 1">
             <a:extLst>
               <a:ext uri="{FF2B5EF4-FFF2-40B4-BE49-F238E27FC236}">
-                <a16:creationId xmlns:a16="http://schemas.microsoft.com/office/drawing/2014/main" id="{BF46AD76-529C-9CE5-3D60-3D7C7E78E8D2}"/>
+                <a16:creationId xmlns:a16="http://schemas.microsoft.com/office/drawing/2014/main" id="{DB7F8949-4EAD-284C-4DF5-A2FE6BB97F6B}"/>
               </a:ext>
             </a:extLst>
           </p:cNvPr>
@@ -8312,58 +8151,17 @@
           <a:p>
             <a:r>
               <a:rPr lang="en-US" dirty="0"/>
-              <a:t>Syntax Styles</a:t>
-            </a:r>
-          </a:p>
-        </p:txBody>
-      </p:sp>
-      <p:pic>
-        <p:nvPicPr>
-          <p:cNvPr id="23" name="Picture Placeholder 22">
-            <a:extLst>
-              <a:ext uri="{FF2B5EF4-FFF2-40B4-BE49-F238E27FC236}">
-                <a16:creationId xmlns:a16="http://schemas.microsoft.com/office/drawing/2014/main" id="{FCDC0301-BEF2-74FE-F2CF-64AC5AEAB05C}"/>
-              </a:ext>
-            </a:extLst>
-          </p:cNvPr>
-          <p:cNvPicPr>
-            <a:picLocks noGrp="1" noChangeAspect="1"/>
-          </p:cNvPicPr>
-          <p:nvPr>
-            <p:ph type="pic" sz="quarter" idx="13"/>
-          </p:nvPr>
-        </p:nvPicPr>
-        <p:blipFill rotWithShape="1">
-          <a:blip r:embed="rId2"/>
-          <a:srcRect l="4895" r="1456"/>
-          <a:stretch/>
-        </p:blipFill>
-        <p:spPr>
-          <a:xfrm>
-            <a:off x="865632" y="2798051"/>
-            <a:ext cx="3703320" cy="2911734"/>
-          </a:xfrm>
-          <a:prstGeom prst="rect">
-            <a:avLst/>
-          </a:prstGeom>
-          <a:ln>
-            <a:noFill/>
-          </a:ln>
-          <a:effectLst>
-            <a:outerShdw blurRad="292100" dist="139700" dir="2700000" algn="tl" rotWithShape="0">
-              <a:srgbClr val="333333">
-                <a:alpha val="65000"/>
-              </a:srgbClr>
-            </a:outerShdw>
-          </a:effectLst>
-        </p:spPr>
-      </p:pic>
-      <p:sp>
-        <p:nvSpPr>
-          <p:cNvPr id="6" name="Content Placeholder 5">
-            <a:extLst>
-              <a:ext uri="{FF2B5EF4-FFF2-40B4-BE49-F238E27FC236}">
-                <a16:creationId xmlns:a16="http://schemas.microsoft.com/office/drawing/2014/main" id="{C42D24F6-F720-AEB9-1C97-B5AD830B5648}"/>
+              <a:t>Benefits</a:t>
+            </a:r>
+          </a:p>
+        </p:txBody>
+      </p:sp>
+      <p:sp>
+        <p:nvSpPr>
+          <p:cNvPr id="3" name="Content Placeholder 2">
+            <a:extLst>
+              <a:ext uri="{FF2B5EF4-FFF2-40B4-BE49-F238E27FC236}">
+                <a16:creationId xmlns:a16="http://schemas.microsoft.com/office/drawing/2014/main" id="{A9BA8B6A-41D2-AFE7-8A3C-A039558E5302}"/>
               </a:ext>
             </a:extLst>
           </p:cNvPr>
@@ -8374,61 +8172,68 @@
             <p:ph idx="1"/>
           </p:nvPr>
         </p:nvSpPr>
-        <p:spPr/>
-        <p:txBody>
-          <a:bodyPr>
-            <a:normAutofit/>
-          </a:bodyPr>
-          <a:lstStyle/>
-          <a:p>
-            <a:pPr marL="514350" indent="-514350">
-              <a:buFont typeface="+mj-lt"/>
-              <a:buAutoNum type="arabicPeriod"/>
-            </a:pPr>
-            <a:r>
-              <a:rPr lang="en-US" dirty="0"/>
-              <a:t>Method Syntax</a:t>
-            </a:r>
-          </a:p>
-          <a:p>
-            <a:pPr marL="514350" indent="-514350">
-              <a:buFont typeface="+mj-lt"/>
-              <a:buAutoNum type="arabicPeriod"/>
-            </a:pPr>
-            <a:endParaRPr lang="en-US" dirty="0"/>
-          </a:p>
-          <a:p>
-            <a:pPr marL="514350" indent="-514350">
-              <a:buFont typeface="+mj-lt"/>
-              <a:buAutoNum type="arabicPeriod"/>
-            </a:pPr>
-            <a:endParaRPr lang="en-US" dirty="0"/>
-          </a:p>
-          <a:p>
-            <a:pPr marL="514350" indent="-514350">
-              <a:buFont typeface="+mj-lt"/>
-              <a:buAutoNum type="arabicPeriod"/>
-            </a:pPr>
-            <a:r>
-              <a:rPr lang="en-US" dirty="0"/>
-              <a:t>Query Syntax</a:t>
-            </a:r>
-          </a:p>
-          <a:p>
-            <a:pPr marL="514350" indent="-514350">
-              <a:buFont typeface="+mj-lt"/>
-              <a:buAutoNum type="arabicPeriod"/>
-            </a:pPr>
-            <a:endParaRPr lang="en-US" dirty="0"/>
-          </a:p>
-        </p:txBody>
-      </p:sp>
-      <p:sp>
-        <p:nvSpPr>
-          <p:cNvPr id="9" name="Slide Number Placeholder 8">
-            <a:extLst>
-              <a:ext uri="{FF2B5EF4-FFF2-40B4-BE49-F238E27FC236}">
-                <a16:creationId xmlns:a16="http://schemas.microsoft.com/office/drawing/2014/main" id="{F1FCD897-3044-B6DC-A87C-40EA89DE6FDF}"/>
+        <p:spPr>
+          <a:xfrm>
+            <a:off x="1517904" y="2432305"/>
+            <a:ext cx="9144000" cy="3127248"/>
+          </a:xfrm>
+        </p:spPr>
+        <p:txBody>
+          <a:bodyPr/>
+          <a:lstStyle/>
+          <a:p>
+            <a:r>
+              <a:rPr lang="en-US" sz="2400" b="1" i="0" dirty="0">
+                <a:effectLst/>
+              </a:rPr>
+              <a:t>Simplicity : </a:t>
+            </a:r>
+            <a:r>
+              <a:rPr lang="en-US" sz="2400" b="0" i="0" dirty="0">
+                <a:effectLst/>
+              </a:rPr>
+              <a:t>LINQ provides a simplified syntax, making it easier to write and understand complex queries.</a:t>
+            </a:r>
+          </a:p>
+          <a:p>
+            <a:r>
+              <a:rPr lang="en-US" sz="2400" b="1" dirty="0"/>
+              <a:t>Less Code : </a:t>
+            </a:r>
+            <a:r>
+              <a:rPr lang="en-US" sz="2400" dirty="0"/>
+              <a:t>Multiple/nested loops are replaced with more compact form</a:t>
+            </a:r>
+          </a:p>
+          <a:p>
+            <a:r>
+              <a:rPr lang="en-US" sz="2400" b="1" i="0" dirty="0">
+                <a:effectLst/>
+              </a:rPr>
+              <a:t>Querying Multiple Data Sources: </a:t>
+            </a:r>
+            <a:r>
+              <a:rPr lang="en-US" sz="2400" i="0" dirty="0">
+                <a:effectLst/>
+              </a:rPr>
+              <a:t>XML ,Json , Array, list, data table</a:t>
+            </a:r>
+            <a:endParaRPr lang="en-US" sz="2400" dirty="0"/>
+          </a:p>
+          <a:p>
+            <a:endParaRPr lang="en-US" i="0" dirty="0">
+              <a:effectLst/>
+              <a:latin typeface="Söhne"/>
+            </a:endParaRPr>
+          </a:p>
+        </p:txBody>
+      </p:sp>
+      <p:sp>
+        <p:nvSpPr>
+          <p:cNvPr id="6" name="Slide Number Placeholder 5">
+            <a:extLst>
+              <a:ext uri="{FF2B5EF4-FFF2-40B4-BE49-F238E27FC236}">
+                <a16:creationId xmlns:a16="http://schemas.microsoft.com/office/drawing/2014/main" id="{CF921441-D39A-70CA-6E1E-ADDE95D4D2EF}"/>
               </a:ext>
             </a:extLst>
           </p:cNvPr>
@@ -8452,70 +8257,10 @@
           </a:p>
         </p:txBody>
       </p:sp>
-      <p:pic>
-        <p:nvPicPr>
-          <p:cNvPr id="17" name="Picture 16">
-            <a:extLst>
-              <a:ext uri="{FF2B5EF4-FFF2-40B4-BE49-F238E27FC236}">
-                <a16:creationId xmlns:a16="http://schemas.microsoft.com/office/drawing/2014/main" id="{DF6980DE-5175-BAB6-3297-302309A7076C}"/>
-              </a:ext>
-            </a:extLst>
-          </p:cNvPr>
-          <p:cNvPicPr>
-            <a:picLocks noChangeAspect="1"/>
-          </p:cNvPicPr>
-          <p:nvPr/>
-        </p:nvPicPr>
-        <p:blipFill>
-          <a:blip r:embed="rId3"/>
-          <a:stretch>
-            <a:fillRect/>
-          </a:stretch>
-        </p:blipFill>
-        <p:spPr>
-          <a:xfrm>
-            <a:off x="6096000" y="3644318"/>
-            <a:ext cx="4991100" cy="609600"/>
-          </a:xfrm>
-          <a:prstGeom prst="rect">
-            <a:avLst/>
-          </a:prstGeom>
-        </p:spPr>
-      </p:pic>
-      <p:pic>
-        <p:nvPicPr>
-          <p:cNvPr id="19" name="Picture 18">
-            <a:extLst>
-              <a:ext uri="{FF2B5EF4-FFF2-40B4-BE49-F238E27FC236}">
-                <a16:creationId xmlns:a16="http://schemas.microsoft.com/office/drawing/2014/main" id="{8E42E156-6C8C-DA0B-200C-26B997CB1FA4}"/>
-              </a:ext>
-            </a:extLst>
-          </p:cNvPr>
-          <p:cNvPicPr>
-            <a:picLocks noChangeAspect="1"/>
-          </p:cNvPicPr>
-          <p:nvPr/>
-        </p:nvPicPr>
-        <p:blipFill>
-          <a:blip r:embed="rId4"/>
-          <a:stretch>
-            <a:fillRect/>
-          </a:stretch>
-        </p:blipFill>
-        <p:spPr>
-          <a:xfrm>
-            <a:off x="6096000" y="5124379"/>
-            <a:ext cx="4991100" cy="613754"/>
-          </a:xfrm>
-          <a:prstGeom prst="rect">
-            <a:avLst/>
-          </a:prstGeom>
-        </p:spPr>
-      </p:pic>
     </p:spTree>
     <p:extLst>
       <p:ext uri="{BB962C8B-B14F-4D97-AF65-F5344CB8AC3E}">
-        <p14:creationId xmlns:p14="http://schemas.microsoft.com/office/powerpoint/2010/main" val="2878823389"/>
+        <p14:creationId xmlns:p14="http://schemas.microsoft.com/office/powerpoint/2010/main" val="1450359529"/>
       </p:ext>
     </p:extLst>
   </p:cSld>
@@ -8544,18 +8289,18 @@
       </p:grpSpPr>
       <p:sp>
         <p:nvSpPr>
-          <p:cNvPr id="2" name="Title 1">
-            <a:extLst>
-              <a:ext uri="{FF2B5EF4-FFF2-40B4-BE49-F238E27FC236}">
-                <a16:creationId xmlns:a16="http://schemas.microsoft.com/office/drawing/2014/main" id="{DB7F8949-4EAD-284C-4DF5-A2FE6BB97F6B}"/>
-              </a:ext>
-            </a:extLst>
-          </p:cNvPr>
-          <p:cNvSpPr>
-            <a:spLocks noGrp="1"/>
-          </p:cNvSpPr>
-          <p:nvPr>
-            <p:ph type="title"/>
+          <p:cNvPr id="3" name="Title 2">
+            <a:extLst>
+              <a:ext uri="{FF2B5EF4-FFF2-40B4-BE49-F238E27FC236}">
+                <a16:creationId xmlns:a16="http://schemas.microsoft.com/office/drawing/2014/main" id="{DE8AB8B5-DF2A-8185-30AA-3CEABB65EAD7}"/>
+              </a:ext>
+            </a:extLst>
+          </p:cNvPr>
+          <p:cNvSpPr>
+            <a:spLocks noGrp="1"/>
+          </p:cNvSpPr>
+          <p:nvPr>
+            <p:ph type="ctrTitle"/>
           </p:nvPr>
         </p:nvSpPr>
         <p:spPr/>
@@ -8563,118 +8308,136 @@
           <a:bodyPr/>
           <a:lstStyle/>
           <a:p>
-            <a:r>
-              <a:rPr lang="en-US" dirty="0"/>
-              <a:t>Benefits</a:t>
-            </a:r>
-          </a:p>
-        </p:txBody>
-      </p:sp>
-      <p:sp>
-        <p:nvSpPr>
-          <p:cNvPr id="3" name="Content Placeholder 2">
-            <a:extLst>
-              <a:ext uri="{FF2B5EF4-FFF2-40B4-BE49-F238E27FC236}">
-                <a16:creationId xmlns:a16="http://schemas.microsoft.com/office/drawing/2014/main" id="{A9BA8B6A-41D2-AFE7-8A3C-A039558E5302}"/>
-              </a:ext>
-            </a:extLst>
-          </p:cNvPr>
-          <p:cNvSpPr>
-            <a:spLocks noGrp="1"/>
-          </p:cNvSpPr>
-          <p:nvPr>
-            <p:ph idx="1"/>
-          </p:nvPr>
-        </p:nvSpPr>
-        <p:spPr>
-          <a:xfrm>
-            <a:off x="1517904" y="2432305"/>
-            <a:ext cx="9144000" cy="3127248"/>
-          </a:xfrm>
-        </p:spPr>
+            <a:endParaRPr lang="en-US"/>
+          </a:p>
+        </p:txBody>
+      </p:sp>
+      <p:sp>
+        <p:nvSpPr>
+          <p:cNvPr id="4" name="Subtitle 3">
+            <a:extLst>
+              <a:ext uri="{FF2B5EF4-FFF2-40B4-BE49-F238E27FC236}">
+                <a16:creationId xmlns:a16="http://schemas.microsoft.com/office/drawing/2014/main" id="{ED88E5F8-E73A-A4B1-8025-D3F465388DF6}"/>
+              </a:ext>
+            </a:extLst>
+          </p:cNvPr>
+          <p:cNvSpPr>
+            <a:spLocks noGrp="1"/>
+          </p:cNvSpPr>
+          <p:nvPr>
+            <p:ph type="subTitle" idx="1"/>
+          </p:nvPr>
+        </p:nvSpPr>
+        <p:spPr/>
         <p:txBody>
           <a:bodyPr/>
           <a:lstStyle/>
           <a:p>
-            <a:r>
-              <a:rPr lang="en-US" sz="2400" b="1" i="0" dirty="0">
-                <a:effectLst/>
-              </a:rPr>
-              <a:t>Simplicity : </a:t>
-            </a:r>
-            <a:r>
-              <a:rPr lang="en-US" sz="2400" b="0" i="0" dirty="0">
-                <a:effectLst/>
-              </a:rPr>
-              <a:t>LINQ provides a simplified syntax, making it easier to write and understand complex queries.</a:t>
-            </a:r>
-          </a:p>
-          <a:p>
-            <a:r>
-              <a:rPr lang="en-US" sz="2400" b="1" dirty="0"/>
-              <a:t>Less Code : </a:t>
-            </a:r>
-            <a:r>
-              <a:rPr lang="en-US" sz="2400" dirty="0"/>
-              <a:t>Multiple/nested loops are replaced with more compact form</a:t>
-            </a:r>
-          </a:p>
-          <a:p>
-            <a:r>
-              <a:rPr lang="en-US" sz="2400" b="1" i="0" dirty="0">
-                <a:effectLst/>
-              </a:rPr>
-              <a:t>Querying Multiple Data Sources: </a:t>
-            </a:r>
-            <a:r>
-              <a:rPr lang="en-US" sz="2400" i="0" dirty="0">
-                <a:effectLst/>
-              </a:rPr>
-              <a:t>XML ,Json , Array, list, data table</a:t>
-            </a:r>
-            <a:endParaRPr lang="en-US" sz="2400" dirty="0"/>
-          </a:p>
-          <a:p>
-            <a:endParaRPr lang="en-US" i="0" dirty="0">
-              <a:effectLst/>
-              <a:latin typeface="Söhne"/>
-            </a:endParaRPr>
-          </a:p>
-        </p:txBody>
-      </p:sp>
-      <p:sp>
-        <p:nvSpPr>
-          <p:cNvPr id="6" name="Slide Number Placeholder 5">
-            <a:extLst>
-              <a:ext uri="{FF2B5EF4-FFF2-40B4-BE49-F238E27FC236}">
-                <a16:creationId xmlns:a16="http://schemas.microsoft.com/office/drawing/2014/main" id="{CF921441-D39A-70CA-6E1E-ADDE95D4D2EF}"/>
-              </a:ext>
-            </a:extLst>
-          </p:cNvPr>
-          <p:cNvSpPr>
-            <a:spLocks noGrp="1"/>
-          </p:cNvSpPr>
-          <p:nvPr>
-            <p:ph type="sldNum" sz="quarter" idx="12"/>
-          </p:nvPr>
-        </p:nvSpPr>
-        <p:spPr/>
-        <p:txBody>
-          <a:bodyPr/>
-          <a:lstStyle/>
-          <a:p>
-            <a:fld id="{CB1E4CB7-CB13-4810-BF18-BE31AFC64F93}" type="slidenum">
-              <a:rPr lang="en-US" smtClean="0"/>
-              <a:t>6</a:t>
-            </a:fld>
             <a:endParaRPr lang="en-US"/>
+          </a:p>
+        </p:txBody>
+      </p:sp>
+      <p:pic>
+        <p:nvPicPr>
+          <p:cNvPr id="5" name="Picture Placeholder 15">
+            <a:extLst>
+              <a:ext uri="{FF2B5EF4-FFF2-40B4-BE49-F238E27FC236}">
+                <a16:creationId xmlns:a16="http://schemas.microsoft.com/office/drawing/2014/main" id="{1BB0471B-1DD1-07E5-26E8-FA10AADC115E}"/>
+              </a:ext>
+            </a:extLst>
+          </p:cNvPr>
+          <p:cNvPicPr>
+            <a:picLocks noGrp="1" noChangeAspect="1"/>
+          </p:cNvPicPr>
+          <p:nvPr>
+            <p:ph type="pic" sz="quarter" idx="13"/>
+          </p:nvPr>
+        </p:nvPicPr>
+        <p:blipFill>
+          <a:blip r:embed="rId2"/>
+          <a:srcRect t="7488" b="7488"/>
+          <a:stretch>
+            <a:fillRect/>
+          </a:stretch>
+        </p:blipFill>
+        <p:spPr>
+          <a:xfrm>
+            <a:off x="746125" y="755650"/>
+            <a:ext cx="10699750" cy="5340349"/>
+          </a:xfrm>
+          <a:prstGeom prst="rect">
+            <a:avLst/>
+          </a:prstGeom>
+          <a:ln>
+            <a:noFill/>
+          </a:ln>
+          <a:effectLst>
+            <a:outerShdw blurRad="292100" dist="139700" dir="2700000" algn="tl" rotWithShape="0">
+              <a:srgbClr val="333333">
+                <a:alpha val="65000"/>
+              </a:srgbClr>
+            </a:outerShdw>
+          </a:effectLst>
+        </p:spPr>
+      </p:pic>
+      <p:sp>
+        <p:nvSpPr>
+          <p:cNvPr id="6" name="Title 1">
+            <a:extLst>
+              <a:ext uri="{FF2B5EF4-FFF2-40B4-BE49-F238E27FC236}">
+                <a16:creationId xmlns:a16="http://schemas.microsoft.com/office/drawing/2014/main" id="{7F4C223F-4950-A9BB-2B77-89BBC2FAF101}"/>
+              </a:ext>
+            </a:extLst>
+          </p:cNvPr>
+          <p:cNvSpPr txBox="1">
+            <a:spLocks/>
+          </p:cNvSpPr>
+          <p:nvPr/>
+        </p:nvSpPr>
+        <p:spPr>
+          <a:xfrm>
+            <a:off x="1400291" y="2030527"/>
+            <a:ext cx="4480560" cy="2796945"/>
+          </a:xfrm>
+          <a:prstGeom prst="rect">
+            <a:avLst/>
+          </a:prstGeom>
+        </p:spPr>
+        <p:txBody>
+          <a:bodyPr vert="horz" lIns="91440" tIns="45720" rIns="91440" bIns="45720" rtlCol="0" anchor="ctr">
+            <a:normAutofit/>
+          </a:bodyPr>
+          <a:lstStyle>
+            <a:lvl1pPr algn="l" defTabSz="914400" rtl="0" eaLnBrk="1" latinLnBrk="0" hangingPunct="1">
+              <a:lnSpc>
+                <a:spcPct val="95000"/>
+              </a:lnSpc>
+              <a:spcBef>
+                <a:spcPct val="0"/>
+              </a:spcBef>
+              <a:buNone/>
+              <a:defRPr sz="4400" kern="1200" spc="-50" baseline="0">
+                <a:solidFill>
+                  <a:schemeClr val="tx1"/>
+                </a:solidFill>
+                <a:latin typeface="+mj-lt"/>
+                <a:ea typeface="+mj-ea"/>
+                <a:cs typeface="+mj-cs"/>
+              </a:defRPr>
+            </a:lvl1pPr>
+          </a:lstStyle>
+          <a:p>
+            <a:r>
+              <a:rPr lang="en-US" b="1" dirty="0"/>
+              <a:t>LINQ Use Cases</a:t>
+            </a:r>
           </a:p>
         </p:txBody>
       </p:sp>
     </p:spTree>
     <p:extLst>
       <p:ext uri="{BB962C8B-B14F-4D97-AF65-F5344CB8AC3E}">
-        <p14:creationId xmlns:p14="http://schemas.microsoft.com/office/powerpoint/2010/main" val="1450359529"/>
+        <p14:creationId xmlns:p14="http://schemas.microsoft.com/office/powerpoint/2010/main" val="2070390800"/>
       </p:ext>
     </p:extLst>
   </p:cSld>
@@ -8703,183 +8466,6 @@
       </p:grpSpPr>
       <p:sp>
         <p:nvSpPr>
-          <p:cNvPr id="3" name="Title 2">
-            <a:extLst>
-              <a:ext uri="{FF2B5EF4-FFF2-40B4-BE49-F238E27FC236}">
-                <a16:creationId xmlns:a16="http://schemas.microsoft.com/office/drawing/2014/main" id="{DE8AB8B5-DF2A-8185-30AA-3CEABB65EAD7}"/>
-              </a:ext>
-            </a:extLst>
-          </p:cNvPr>
-          <p:cNvSpPr>
-            <a:spLocks noGrp="1"/>
-          </p:cNvSpPr>
-          <p:nvPr>
-            <p:ph type="ctrTitle"/>
-          </p:nvPr>
-        </p:nvSpPr>
-        <p:spPr/>
-        <p:txBody>
-          <a:bodyPr/>
-          <a:lstStyle/>
-          <a:p>
-            <a:endParaRPr lang="en-US"/>
-          </a:p>
-        </p:txBody>
-      </p:sp>
-      <p:sp>
-        <p:nvSpPr>
-          <p:cNvPr id="4" name="Subtitle 3">
-            <a:extLst>
-              <a:ext uri="{FF2B5EF4-FFF2-40B4-BE49-F238E27FC236}">
-                <a16:creationId xmlns:a16="http://schemas.microsoft.com/office/drawing/2014/main" id="{ED88E5F8-E73A-A4B1-8025-D3F465388DF6}"/>
-              </a:ext>
-            </a:extLst>
-          </p:cNvPr>
-          <p:cNvSpPr>
-            <a:spLocks noGrp="1"/>
-          </p:cNvSpPr>
-          <p:nvPr>
-            <p:ph type="subTitle" idx="1"/>
-          </p:nvPr>
-        </p:nvSpPr>
-        <p:spPr/>
-        <p:txBody>
-          <a:bodyPr/>
-          <a:lstStyle/>
-          <a:p>
-            <a:endParaRPr lang="en-US"/>
-          </a:p>
-        </p:txBody>
-      </p:sp>
-      <p:pic>
-        <p:nvPicPr>
-          <p:cNvPr id="5" name="Picture Placeholder 15">
-            <a:extLst>
-              <a:ext uri="{FF2B5EF4-FFF2-40B4-BE49-F238E27FC236}">
-                <a16:creationId xmlns:a16="http://schemas.microsoft.com/office/drawing/2014/main" id="{1BB0471B-1DD1-07E5-26E8-FA10AADC115E}"/>
-              </a:ext>
-            </a:extLst>
-          </p:cNvPr>
-          <p:cNvPicPr>
-            <a:picLocks noGrp="1" noChangeAspect="1"/>
-          </p:cNvPicPr>
-          <p:nvPr>
-            <p:ph type="pic" sz="quarter" idx="13"/>
-          </p:nvPr>
-        </p:nvPicPr>
-        <p:blipFill>
-          <a:blip r:embed="rId2"/>
-          <a:srcRect t="7488" b="7488"/>
-          <a:stretch>
-            <a:fillRect/>
-          </a:stretch>
-        </p:blipFill>
-        <p:spPr>
-          <a:xfrm>
-            <a:off x="746125" y="755650"/>
-            <a:ext cx="10699750" cy="5340349"/>
-          </a:xfrm>
-          <a:prstGeom prst="rect">
-            <a:avLst/>
-          </a:prstGeom>
-          <a:ln>
-            <a:noFill/>
-          </a:ln>
-          <a:effectLst>
-            <a:outerShdw blurRad="292100" dist="139700" dir="2700000" algn="tl" rotWithShape="0">
-              <a:srgbClr val="333333">
-                <a:alpha val="65000"/>
-              </a:srgbClr>
-            </a:outerShdw>
-          </a:effectLst>
-        </p:spPr>
-      </p:pic>
-      <p:sp>
-        <p:nvSpPr>
-          <p:cNvPr id="6" name="Title 1">
-            <a:extLst>
-              <a:ext uri="{FF2B5EF4-FFF2-40B4-BE49-F238E27FC236}">
-                <a16:creationId xmlns:a16="http://schemas.microsoft.com/office/drawing/2014/main" id="{7F4C223F-4950-A9BB-2B77-89BBC2FAF101}"/>
-              </a:ext>
-            </a:extLst>
-          </p:cNvPr>
-          <p:cNvSpPr txBox="1">
-            <a:spLocks/>
-          </p:cNvSpPr>
-          <p:nvPr/>
-        </p:nvSpPr>
-        <p:spPr>
-          <a:xfrm>
-            <a:off x="1400291" y="2030527"/>
-            <a:ext cx="4480560" cy="2796945"/>
-          </a:xfrm>
-          <a:prstGeom prst="rect">
-            <a:avLst/>
-          </a:prstGeom>
-        </p:spPr>
-        <p:txBody>
-          <a:bodyPr vert="horz" lIns="91440" tIns="45720" rIns="91440" bIns="45720" rtlCol="0" anchor="ctr">
-            <a:normAutofit/>
-          </a:bodyPr>
-          <a:lstStyle>
-            <a:lvl1pPr algn="l" defTabSz="914400" rtl="0" eaLnBrk="1" latinLnBrk="0" hangingPunct="1">
-              <a:lnSpc>
-                <a:spcPct val="95000"/>
-              </a:lnSpc>
-              <a:spcBef>
-                <a:spcPct val="0"/>
-              </a:spcBef>
-              <a:buNone/>
-              <a:defRPr sz="4400" kern="1200" spc="-50" baseline="0">
-                <a:solidFill>
-                  <a:schemeClr val="tx1"/>
-                </a:solidFill>
-                <a:latin typeface="+mj-lt"/>
-                <a:ea typeface="+mj-ea"/>
-                <a:cs typeface="+mj-cs"/>
-              </a:defRPr>
-            </a:lvl1pPr>
-          </a:lstStyle>
-          <a:p>
-            <a:r>
-              <a:rPr lang="en-US" b="1" dirty="0"/>
-              <a:t>LINQ Use Cases</a:t>
-            </a:r>
-          </a:p>
-        </p:txBody>
-      </p:sp>
-    </p:spTree>
-    <p:extLst>
-      <p:ext uri="{BB962C8B-B14F-4D97-AF65-F5344CB8AC3E}">
-        <p14:creationId xmlns:p14="http://schemas.microsoft.com/office/powerpoint/2010/main" val="2070390800"/>
-      </p:ext>
-    </p:extLst>
-  </p:cSld>
-  <p:clrMapOvr>
-    <a:masterClrMapping/>
-  </p:clrMapOvr>
-</p:sld>
-</file>
-
-<file path=ppt/slides/slide8.xml><?xml version="1.0" encoding="utf-8"?>
-<p:sld xmlns:a="http://schemas.openxmlformats.org/drawingml/2006/main" xmlns:r="http://schemas.openxmlformats.org/officeDocument/2006/relationships" xmlns:p="http://schemas.openxmlformats.org/presentationml/2006/main">
-  <p:cSld>
-    <p:spTree>
-      <p:nvGrpSpPr>
-        <p:cNvPr id="1" name=""/>
-        <p:cNvGrpSpPr/>
-        <p:nvPr/>
-      </p:nvGrpSpPr>
-      <p:grpSpPr>
-        <a:xfrm>
-          <a:off x="0" y="0"/>
-          <a:ext cx="0" cy="0"/>
-          <a:chOff x="0" y="0"/>
-          <a:chExt cx="0" cy="0"/>
-        </a:xfrm>
-      </p:grpSpPr>
-      <p:sp>
-        <p:nvSpPr>
           <p:cNvPr id="2" name="Title 1">
             <a:extLst>
               <a:ext uri="{FF2B5EF4-FFF2-40B4-BE49-F238E27FC236}">
@@ -8967,7 +8553,7 @@
           <a:p>
             <a:fld id="{CB1E4CB7-CB13-4810-BF18-BE31AFC64F93}" type="slidenum">
               <a:rPr lang="en-US" smtClean="0"/>
-              <a:t>8</a:t>
+              <a:t>7</a:t>
             </a:fld>
             <a:endParaRPr lang="en-US"/>
           </a:p>
@@ -9076,7 +8662,7 @@
 </p:sld>
 </file>
 
-<file path=ppt/slides/slide9.xml><?xml version="1.0" encoding="utf-8"?>
+<file path=ppt/slides/slide8.xml><?xml version="1.0" encoding="utf-8"?>
 <p:sld xmlns:a="http://schemas.openxmlformats.org/drawingml/2006/main" xmlns:r="http://schemas.openxmlformats.org/officeDocument/2006/relationships" xmlns:p="http://schemas.openxmlformats.org/presentationml/2006/main">
   <p:cSld>
     <p:spTree>
@@ -9188,7 +8774,7 @@
           <a:p>
             <a:fld id="{CB1E4CB7-CB13-4810-BF18-BE31AFC64F93}" type="slidenum">
               <a:rPr lang="en-US" smtClean="0"/>
-              <a:t>9</a:t>
+              <a:t>8</a:t>
             </a:fld>
             <a:endParaRPr lang="en-US"/>
           </a:p>
@@ -9288,6 +8874,227 @@
     <p:extLst>
       <p:ext uri="{BB962C8B-B14F-4D97-AF65-F5344CB8AC3E}">
         <p14:creationId xmlns:p14="http://schemas.microsoft.com/office/powerpoint/2010/main" val="571924740"/>
+      </p:ext>
+    </p:extLst>
+  </p:cSld>
+  <p:clrMapOvr>
+    <a:masterClrMapping/>
+  </p:clrMapOvr>
+</p:sld>
+</file>
+
+<file path=ppt/slides/slide9.xml><?xml version="1.0" encoding="utf-8"?>
+<p:sld xmlns:a="http://schemas.openxmlformats.org/drawingml/2006/main" xmlns:r="http://schemas.openxmlformats.org/officeDocument/2006/relationships" xmlns:p="http://schemas.openxmlformats.org/presentationml/2006/main">
+  <p:cSld>
+    <p:spTree>
+      <p:nvGrpSpPr>
+        <p:cNvPr id="1" name="">
+          <a:extLst>
+            <a:ext uri="{FF2B5EF4-FFF2-40B4-BE49-F238E27FC236}">
+              <a16:creationId xmlns:a16="http://schemas.microsoft.com/office/drawing/2014/main" id="{AFFC4AAC-8960-83D9-E898-63F5849368DC}"/>
+            </a:ext>
+          </a:extLst>
+        </p:cNvPr>
+        <p:cNvGrpSpPr/>
+        <p:nvPr/>
+      </p:nvGrpSpPr>
+      <p:grpSpPr>
+        <a:xfrm>
+          <a:off x="0" y="0"/>
+          <a:ext cx="0" cy="0"/>
+          <a:chOff x="0" y="0"/>
+          <a:chExt cx="0" cy="0"/>
+        </a:xfrm>
+      </p:grpSpPr>
+      <p:sp>
+        <p:nvSpPr>
+          <p:cNvPr id="2" name="Title 1">
+            <a:extLst>
+              <a:ext uri="{FF2B5EF4-FFF2-40B4-BE49-F238E27FC236}">
+                <a16:creationId xmlns:a16="http://schemas.microsoft.com/office/drawing/2014/main" id="{6995E0EE-9B45-C790-ED8F-C1AD728C98D0}"/>
+              </a:ext>
+            </a:extLst>
+          </p:cNvPr>
+          <p:cNvSpPr>
+            <a:spLocks noGrp="1"/>
+          </p:cNvSpPr>
+          <p:nvPr>
+            <p:ph type="title"/>
+          </p:nvPr>
+        </p:nvSpPr>
+        <p:spPr/>
+        <p:txBody>
+          <a:bodyPr/>
+          <a:lstStyle/>
+          <a:p>
+            <a:r>
+              <a:rPr lang="en-US" dirty="0"/>
+              <a:t>Use Case3</a:t>
+            </a:r>
+          </a:p>
+        </p:txBody>
+      </p:sp>
+      <p:sp>
+        <p:nvSpPr>
+          <p:cNvPr id="3" name="Content Placeholder 2">
+            <a:extLst>
+              <a:ext uri="{FF2B5EF4-FFF2-40B4-BE49-F238E27FC236}">
+                <a16:creationId xmlns:a16="http://schemas.microsoft.com/office/drawing/2014/main" id="{2609771F-212F-14EB-AD6A-C4B60430E12F}"/>
+              </a:ext>
+            </a:extLst>
+          </p:cNvPr>
+          <p:cNvSpPr>
+            <a:spLocks noGrp="1"/>
+          </p:cNvSpPr>
+          <p:nvPr>
+            <p:ph idx="1"/>
+          </p:nvPr>
+        </p:nvSpPr>
+        <p:spPr>
+          <a:xfrm>
+            <a:off x="1286414" y="2492076"/>
+            <a:ext cx="4468033" cy="3127248"/>
+          </a:xfrm>
+        </p:spPr>
+        <p:txBody>
+          <a:bodyPr>
+            <a:normAutofit/>
+          </a:bodyPr>
+          <a:lstStyle/>
+          <a:p>
+            <a:pPr marL="0" indent="0">
+              <a:buNone/>
+            </a:pPr>
+            <a:r>
+              <a:rPr lang="en-US" sz="2400" dirty="0"/>
+              <a:t>In data table, which contains departments and their corresponding salaries, your task is to calculate the total salary for each department. </a:t>
+            </a:r>
+          </a:p>
+        </p:txBody>
+      </p:sp>
+      <p:sp>
+        <p:nvSpPr>
+          <p:cNvPr id="6" name="Slide Number Placeholder 5">
+            <a:extLst>
+              <a:ext uri="{FF2B5EF4-FFF2-40B4-BE49-F238E27FC236}">
+                <a16:creationId xmlns:a16="http://schemas.microsoft.com/office/drawing/2014/main" id="{0E04C06E-EBDD-A39E-58CC-3437CDF693A7}"/>
+              </a:ext>
+            </a:extLst>
+          </p:cNvPr>
+          <p:cNvSpPr>
+            <a:spLocks noGrp="1"/>
+          </p:cNvSpPr>
+          <p:nvPr>
+            <p:ph type="sldNum" sz="quarter" idx="12"/>
+          </p:nvPr>
+        </p:nvSpPr>
+        <p:spPr/>
+        <p:txBody>
+          <a:bodyPr/>
+          <a:lstStyle/>
+          <a:p>
+            <a:fld id="{CB1E4CB7-CB13-4810-BF18-BE31AFC64F93}" type="slidenum">
+              <a:rPr lang="en-US" smtClean="0"/>
+              <a:t>9</a:t>
+            </a:fld>
+            <a:endParaRPr lang="en-US"/>
+          </a:p>
+        </p:txBody>
+      </p:sp>
+      <p:pic>
+        <p:nvPicPr>
+          <p:cNvPr id="8" name="Picture 7">
+            <a:extLst>
+              <a:ext uri="{FF2B5EF4-FFF2-40B4-BE49-F238E27FC236}">
+                <a16:creationId xmlns:a16="http://schemas.microsoft.com/office/drawing/2014/main" id="{8A9DFA94-6CCF-367C-AFA3-ECE0F64C3C70}"/>
+              </a:ext>
+            </a:extLst>
+          </p:cNvPr>
+          <p:cNvPicPr>
+            <a:picLocks noChangeAspect="1"/>
+          </p:cNvPicPr>
+          <p:nvPr/>
+        </p:nvPicPr>
+        <p:blipFill>
+          <a:blip r:embed="rId2"/>
+          <a:stretch>
+            <a:fillRect/>
+          </a:stretch>
+        </p:blipFill>
+        <p:spPr>
+          <a:xfrm>
+            <a:off x="5754447" y="1775756"/>
+            <a:ext cx="2858565" cy="3190527"/>
+          </a:xfrm>
+          <a:prstGeom prst="rect">
+            <a:avLst/>
+          </a:prstGeom>
+        </p:spPr>
+      </p:pic>
+      <p:pic>
+        <p:nvPicPr>
+          <p:cNvPr id="10" name="Picture 9">
+            <a:extLst>
+              <a:ext uri="{FF2B5EF4-FFF2-40B4-BE49-F238E27FC236}">
+                <a16:creationId xmlns:a16="http://schemas.microsoft.com/office/drawing/2014/main" id="{80E77136-486C-304F-A331-466D90D93BEB}"/>
+              </a:ext>
+            </a:extLst>
+          </p:cNvPr>
+          <p:cNvPicPr>
+            <a:picLocks noChangeAspect="1"/>
+          </p:cNvPicPr>
+          <p:nvPr/>
+        </p:nvPicPr>
+        <p:blipFill>
+          <a:blip r:embed="rId3"/>
+          <a:stretch>
+            <a:fillRect/>
+          </a:stretch>
+        </p:blipFill>
+        <p:spPr>
+          <a:xfrm>
+            <a:off x="8805672" y="2798090"/>
+            <a:ext cx="2397976" cy="1442607"/>
+          </a:xfrm>
+          <a:prstGeom prst="rect">
+            <a:avLst/>
+          </a:prstGeom>
+        </p:spPr>
+      </p:pic>
+      <p:pic>
+        <p:nvPicPr>
+          <p:cNvPr id="15" name="Picture 14">
+            <a:extLst>
+              <a:ext uri="{FF2B5EF4-FFF2-40B4-BE49-F238E27FC236}">
+                <a16:creationId xmlns:a16="http://schemas.microsoft.com/office/drawing/2014/main" id="{4E5F3BA7-30EC-3745-54FA-76F45A8DBDCD}"/>
+              </a:ext>
+            </a:extLst>
+          </p:cNvPr>
+          <p:cNvPicPr>
+            <a:picLocks noChangeAspect="1"/>
+          </p:cNvPicPr>
+          <p:nvPr/>
+        </p:nvPicPr>
+        <p:blipFill>
+          <a:blip r:embed="rId4"/>
+          <a:stretch>
+            <a:fillRect/>
+          </a:stretch>
+        </p:blipFill>
+        <p:spPr>
+          <a:xfrm>
+            <a:off x="9523315" y="2189988"/>
+            <a:ext cx="962690" cy="457279"/>
+          </a:xfrm>
+          <a:prstGeom prst="rect">
+            <a:avLst/>
+          </a:prstGeom>
+        </p:spPr>
+      </p:pic>
+    </p:spTree>
+    <p:extLst>
+      <p:ext uri="{BB962C8B-B14F-4D97-AF65-F5344CB8AC3E}">
+        <p14:creationId xmlns:p14="http://schemas.microsoft.com/office/powerpoint/2010/main" val="4202168026"/>
       </p:ext>
     </p:extLst>
   </p:cSld>
@@ -9794,6 +9601,34 @@
 </file>
 
 <file path=customXml/item1.xml><?xml version="1.0" encoding="utf-8"?>
+<p:properties xmlns:p="http://schemas.microsoft.com/office/2006/metadata/properties" xmlns:xsi="http://www.w3.org/2001/XMLSchema-instance" xmlns:pc="http://schemas.microsoft.com/office/infopath/2007/PartnerControls">
+  <documentManagement>
+    <Status xmlns="71af3243-3dd4-4a8d-8c0d-dd76da1f02a5">Not started</Status>
+    <_ip_UnifiedCompliancePolicyUIAction xmlns="http://schemas.microsoft.com/sharepoint/v3" xsi:nil="true"/>
+    <Image xmlns="71af3243-3dd4-4a8d-8c0d-dd76da1f02a5">
+      <Url xsi:nil="true"/>
+      <Description xsi:nil="true"/>
+    </Image>
+    <_ip_UnifiedCompliancePolicyProperties xmlns="http://schemas.microsoft.com/sharepoint/v3" xsi:nil="true"/>
+    <lcf76f155ced4ddcb4097134ff3c332f xmlns="71af3243-3dd4-4a8d-8c0d-dd76da1f02a5">
+      <Terms xmlns="http://schemas.microsoft.com/office/infopath/2007/PartnerControls"/>
+    </lcf76f155ced4ddcb4097134ff3c332f>
+    <TaxCatchAll xmlns="230e9df3-be65-4c73-a93b-d1236ebd677e"/>
+    <MediaServiceKeyPoints xmlns="71af3243-3dd4-4a8d-8c0d-dd76da1f02a5" xsi:nil="true"/>
+  </documentManagement>
+</p:properties>
+</file>
+
+<file path=customXml/item2.xml><?xml version="1.0" encoding="utf-8"?>
+<?mso-contentType ?>
+<FormTemplates xmlns="http://schemas.microsoft.com/sharepoint/v3/contenttype/forms">
+  <Display>DocumentLibraryForm</Display>
+  <Edit>DocumentLibraryForm</Edit>
+  <New>DocumentLibraryForm</New>
+</FormTemplates>
+</file>
+
+<file path=customXml/item3.xml><?xml version="1.0" encoding="utf-8"?>
 <ct:contentTypeSchema xmlns:ct="http://schemas.microsoft.com/office/2006/metadata/contentType" xmlns:ma="http://schemas.microsoft.com/office/2006/metadata/properties/metaAttributes" ct:_="" ma:_="" ma:contentTypeName="Document" ma:contentTypeID="0x01010079F111ED35F8CC479449609E8A0923A6" ma:contentTypeVersion="18" ma:contentTypeDescription="Create a new document." ma:contentTypeScope="" ma:versionID="22a266b9fa9a230c5a512669d8b298c3">
   <xsd:schema xmlns:xsd="http://www.w3.org/2001/XMLSchema" xmlns:xs="http://www.w3.org/2001/XMLSchema" xmlns:p="http://schemas.microsoft.com/office/2006/metadata/properties" xmlns:ns1="http://schemas.microsoft.com/sharepoint/v3" xmlns:ns2="71af3243-3dd4-4a8d-8c0d-dd76da1f02a5" xmlns:ns3="16c05727-aa75-4e4a-9b5f-8a80a1165891" xmlns:ns4="230e9df3-be65-4c73-a93b-d1236ebd677e" targetNamespace="http://schemas.microsoft.com/office/2006/metadata/properties" ma:root="true" ma:fieldsID="eddc33fff6b14141ee5c74a0d29ea6a1" ns1:_="" ns2:_="" ns3:_="" ns4:_="">
     <xsd:import namespace="http://schemas.microsoft.com/sharepoint/v3"/>
@@ -10069,35 +9904,27 @@
 </ct:contentTypeSchema>
 </file>
 
-<file path=customXml/item2.xml><?xml version="1.0" encoding="utf-8"?>
-<?mso-contentType ?>
-<FormTemplates xmlns="http://schemas.microsoft.com/sharepoint/v3/contenttype/forms">
-  <Display>DocumentLibraryForm</Display>
-  <Edit>DocumentLibraryForm</Edit>
-  <New>DocumentLibraryForm</New>
-</FormTemplates>
+<file path=customXml/itemProps1.xml><?xml version="1.0" encoding="utf-8"?>
+<ds:datastoreItem xmlns:ds="http://schemas.openxmlformats.org/officeDocument/2006/customXml" ds:itemID="{56B19C5C-61AD-4793-BB9D-6401AD34A775}">
+  <ds:schemaRefs>
+    <ds:schemaRef ds:uri="http://schemas.microsoft.com/office/2006/metadata/properties"/>
+    <ds:schemaRef ds:uri="http://schemas.microsoft.com/office/infopath/2007/PartnerControls"/>
+    <ds:schemaRef ds:uri="71af3243-3dd4-4a8d-8c0d-dd76da1f02a5"/>
+    <ds:schemaRef ds:uri="http://schemas.microsoft.com/sharepoint/v3"/>
+    <ds:schemaRef ds:uri="230e9df3-be65-4c73-a93b-d1236ebd677e"/>
+  </ds:schemaRefs>
+</ds:datastoreItem>
 </file>
 
-<file path=customXml/item3.xml><?xml version="1.0" encoding="utf-8"?>
-<p:properties xmlns:p="http://schemas.microsoft.com/office/2006/metadata/properties" xmlns:xsi="http://www.w3.org/2001/XMLSchema-instance" xmlns:pc="http://schemas.microsoft.com/office/infopath/2007/PartnerControls">
-  <documentManagement>
-    <Status xmlns="71af3243-3dd4-4a8d-8c0d-dd76da1f02a5">Not started</Status>
-    <_ip_UnifiedCompliancePolicyUIAction xmlns="http://schemas.microsoft.com/sharepoint/v3" xsi:nil="true"/>
-    <Image xmlns="71af3243-3dd4-4a8d-8c0d-dd76da1f02a5">
-      <Url xsi:nil="true"/>
-      <Description xsi:nil="true"/>
-    </Image>
-    <_ip_UnifiedCompliancePolicyProperties xmlns="http://schemas.microsoft.com/sharepoint/v3" xsi:nil="true"/>
-    <lcf76f155ced4ddcb4097134ff3c332f xmlns="71af3243-3dd4-4a8d-8c0d-dd76da1f02a5">
-      <Terms xmlns="http://schemas.microsoft.com/office/infopath/2007/PartnerControls"/>
-    </lcf76f155ced4ddcb4097134ff3c332f>
-    <TaxCatchAll xmlns="230e9df3-be65-4c73-a93b-d1236ebd677e"/>
-    <MediaServiceKeyPoints xmlns="71af3243-3dd4-4a8d-8c0d-dd76da1f02a5" xsi:nil="true"/>
-  </documentManagement>
-</p:properties>
+<file path=customXml/itemProps2.xml><?xml version="1.0" encoding="utf-8"?>
+<ds:datastoreItem xmlns:ds="http://schemas.openxmlformats.org/officeDocument/2006/customXml" ds:itemID="{93076797-8467-41BB-91A7-9AE8328A6850}">
+  <ds:schemaRefs>
+    <ds:schemaRef ds:uri="http://schemas.microsoft.com/sharepoint/v3/contenttype/forms"/>
+  </ds:schemaRefs>
+</ds:datastoreItem>
 </file>
 
-<file path=customXml/itemProps1.xml><?xml version="1.0" encoding="utf-8"?>
+<file path=customXml/itemProps3.xml><?xml version="1.0" encoding="utf-8"?>
 <ds:datastoreItem xmlns:ds="http://schemas.openxmlformats.org/officeDocument/2006/customXml" ds:itemID="{F6272451-D558-4710-AF52-0EC1BD4C4244}">
   <ds:schemaRefs>
     <ds:schemaRef ds:uri="http://schemas.microsoft.com/office/2006/metadata/contentType"/>
@@ -10118,26 +9945,6 @@
 </ds:datastoreItem>
 </file>
 
-<file path=customXml/itemProps2.xml><?xml version="1.0" encoding="utf-8"?>
-<ds:datastoreItem xmlns:ds="http://schemas.openxmlformats.org/officeDocument/2006/customXml" ds:itemID="{93076797-8467-41BB-91A7-9AE8328A6850}">
-  <ds:schemaRefs>
-    <ds:schemaRef ds:uri="http://schemas.microsoft.com/sharepoint/v3/contenttype/forms"/>
-  </ds:schemaRefs>
-</ds:datastoreItem>
-</file>
-
-<file path=customXml/itemProps3.xml><?xml version="1.0" encoding="utf-8"?>
-<ds:datastoreItem xmlns:ds="http://schemas.openxmlformats.org/officeDocument/2006/customXml" ds:itemID="{56B19C5C-61AD-4793-BB9D-6401AD34A775}">
-  <ds:schemaRefs>
-    <ds:schemaRef ds:uri="http://schemas.microsoft.com/office/2006/metadata/properties"/>
-    <ds:schemaRef ds:uri="http://schemas.microsoft.com/office/infopath/2007/PartnerControls"/>
-    <ds:schemaRef ds:uri="71af3243-3dd4-4a8d-8c0d-dd76da1f02a5"/>
-    <ds:schemaRef ds:uri="http://schemas.microsoft.com/sharepoint/v3"/>
-    <ds:schemaRef ds:uri="230e9df3-be65-4c73-a93b-d1236ebd677e"/>
-  </ds:schemaRefs>
-</ds:datastoreItem>
-</file>
-
 <file path=docMetadata/LabelInfo.xml><?xml version="1.0" encoding="utf-8"?>
 <clbl:labelList xmlns:clbl="http://schemas.microsoft.com/office/2020/mipLabelMetadata">
   <clbl:label id="{f42aa342-8706-4288-bd11-ebb85995028c}" enabled="1" method="Standard" siteId="{72f988bf-86f1-41af-91ab-2d7cd011db47}" contentBits="0" removed="0"/>

</xml_diff>